<commit_message>
Fix： 1. Comment countryPercentagePane update in PlayersWorldDominationView class.
</commit_message>
<xml_diff>
--- a/documentation/build3/Architecture_build2.pptx
+++ b/documentation/build3/Architecture_build2.pptx
@@ -846,7 +846,7 @@
             <a:fld id="{B61BEF0D-F0BB-DE4B-95CE-6DB70DBA9567}" type="datetimeFigureOut">
               <a:rPr lang="en-US" dirty="0"/>
               <a:pPr/>
-              <a:t>11/29/2018</a:t>
+              <a:t>11/30/18</a:t>
             </a:fld>
             <a:endParaRPr lang="en-US" dirty="0"/>
           </a:p>
@@ -1094,7 +1094,7 @@
             <a:fld id="{B61BEF0D-F0BB-DE4B-95CE-6DB70DBA9567}" type="datetimeFigureOut">
               <a:rPr lang="en-US" dirty="0"/>
               <a:pPr/>
-              <a:t>11/29/2018</a:t>
+              <a:t>11/30/18</a:t>
             </a:fld>
             <a:endParaRPr lang="en-US" dirty="0"/>
           </a:p>
@@ -1405,7 +1405,7 @@
             <a:fld id="{B61BEF0D-F0BB-DE4B-95CE-6DB70DBA9567}" type="datetimeFigureOut">
               <a:rPr lang="en-US" dirty="0"/>
               <a:pPr/>
-              <a:t>11/29/2018</a:t>
+              <a:t>11/30/18</a:t>
             </a:fld>
             <a:endParaRPr lang="en-US" dirty="0"/>
           </a:p>
@@ -1743,7 +1743,7 @@
             <a:fld id="{B61BEF0D-F0BB-DE4B-95CE-6DB70DBA9567}" type="datetimeFigureOut">
               <a:rPr lang="en-US" dirty="0"/>
               <a:pPr/>
-              <a:t>11/29/2018</a:t>
+              <a:t>11/30/18</a:t>
             </a:fld>
             <a:endParaRPr lang="en-US" dirty="0"/>
           </a:p>
@@ -2054,7 +2054,7 @@
             <a:fld id="{B61BEF0D-F0BB-DE4B-95CE-6DB70DBA9567}" type="datetimeFigureOut">
               <a:rPr lang="en-US" dirty="0"/>
               <a:pPr/>
-              <a:t>11/29/2018</a:t>
+              <a:t>11/30/18</a:t>
             </a:fld>
             <a:endParaRPr lang="en-US" dirty="0"/>
           </a:p>
@@ -2444,7 +2444,7 @@
             <a:fld id="{B61BEF0D-F0BB-DE4B-95CE-6DB70DBA9567}" type="datetimeFigureOut">
               <a:rPr lang="en-US" dirty="0"/>
               <a:pPr/>
-              <a:t>11/29/2018</a:t>
+              <a:t>11/30/18</a:t>
             </a:fld>
             <a:endParaRPr lang="en-US" dirty="0"/>
           </a:p>
@@ -2610,7 +2610,7 @@
           <a:p>
             <a:fld id="{55C6B4A9-1611-4792-9094-5F34BCA07E0B}" type="datetimeFigureOut">
               <a:rPr lang="en-US" dirty="0"/>
-              <a:t>11/29/2018</a:t>
+              <a:t>11/30/18</a:t>
             </a:fld>
             <a:endParaRPr lang="en-US" dirty="0"/>
           </a:p>
@@ -2786,7 +2786,7 @@
             <a:fld id="{B61BEF0D-F0BB-DE4B-95CE-6DB70DBA9567}" type="datetimeFigureOut">
               <a:rPr lang="en-US" dirty="0"/>
               <a:pPr/>
-              <a:t>11/29/2018</a:t>
+              <a:t>11/30/18</a:t>
             </a:fld>
             <a:endParaRPr lang="en-US" dirty="0"/>
           </a:p>
@@ -2959,7 +2959,7 @@
             <a:fld id="{B61BEF0D-F0BB-DE4B-95CE-6DB70DBA9567}" type="datetimeFigureOut">
               <a:rPr lang="en-US" dirty="0"/>
               <a:pPr/>
-              <a:t>11/29/2018</a:t>
+              <a:t>11/30/18</a:t>
             </a:fld>
             <a:endParaRPr lang="en-US" dirty="0"/>
           </a:p>
@@ -3203,7 +3203,7 @@
             <a:fld id="{B61BEF0D-F0BB-DE4B-95CE-6DB70DBA9567}" type="datetimeFigureOut">
               <a:rPr lang="en-US" dirty="0"/>
               <a:pPr/>
-              <a:t>11/29/2018</a:t>
+              <a:t>11/30/18</a:t>
             </a:fld>
             <a:endParaRPr lang="en-US" dirty="0"/>
           </a:p>
@@ -3431,7 +3431,7 @@
           <a:p>
             <a:fld id="{EB712588-04B1-427B-82EE-E8DB90309F08}" type="datetimeFigureOut">
               <a:rPr lang="en-US" dirty="0"/>
-              <a:t>11/29/2018</a:t>
+              <a:t>11/30/18</a:t>
             </a:fld>
             <a:endParaRPr lang="en-US" dirty="0"/>
           </a:p>
@@ -3801,7 +3801,7 @@
             <a:fld id="{B61BEF0D-F0BB-DE4B-95CE-6DB70DBA9567}" type="datetimeFigureOut">
               <a:rPr lang="en-US" dirty="0"/>
               <a:pPr/>
-              <a:t>11/29/2018</a:t>
+              <a:t>11/30/18</a:t>
             </a:fld>
             <a:endParaRPr lang="en-US" dirty="0"/>
           </a:p>
@@ -3921,7 +3921,7 @@
             <a:fld id="{B61BEF0D-F0BB-DE4B-95CE-6DB70DBA9567}" type="datetimeFigureOut">
               <a:rPr lang="en-US" dirty="0"/>
               <a:pPr/>
-              <a:t>11/29/2018</a:t>
+              <a:t>11/30/18</a:t>
             </a:fld>
             <a:endParaRPr lang="en-US" dirty="0"/>
           </a:p>
@@ -4013,7 +4013,7 @@
             <a:fld id="{B61BEF0D-F0BB-DE4B-95CE-6DB70DBA9567}" type="datetimeFigureOut">
               <a:rPr lang="en-US" dirty="0"/>
               <a:pPr/>
-              <a:t>11/29/2018</a:t>
+              <a:t>11/30/18</a:t>
             </a:fld>
             <a:endParaRPr lang="en-US" dirty="0"/>
           </a:p>
@@ -4264,7 +4264,7 @@
           <a:p>
             <a:fld id="{42A54C80-263E-416B-A8E0-580EDEADCBDC}" type="datetimeFigureOut">
               <a:rPr lang="en-US" dirty="0"/>
-              <a:t>11/29/2018</a:t>
+              <a:t>11/30/18</a:t>
             </a:fld>
             <a:endParaRPr lang="en-US" dirty="0"/>
           </a:p>
@@ -4523,7 +4523,7 @@
             <a:fld id="{B61BEF0D-F0BB-DE4B-95CE-6DB70DBA9567}" type="datetimeFigureOut">
               <a:rPr lang="en-US" dirty="0"/>
               <a:pPr/>
-              <a:t>11/29/2018</a:t>
+              <a:t>11/30/18</a:t>
             </a:fld>
             <a:endParaRPr lang="en-US" dirty="0"/>
           </a:p>
@@ -5263,7 +5263,7 @@
             <a:fld id="{B61BEF0D-F0BB-DE4B-95CE-6DB70DBA9567}" type="datetimeFigureOut">
               <a:rPr lang="en-US" dirty="0"/>
               <a:pPr/>
-              <a:t>11/29/2018</a:t>
+              <a:t>11/30/18</a:t>
             </a:fld>
             <a:endParaRPr lang="en-US" dirty="0"/>
           </a:p>
@@ -6378,7 +6378,7 @@
         </p:nvSpPr>
         <p:spPr>
           <a:xfrm>
-            <a:off x="677334" y="609600"/>
+            <a:off x="677334" y="84085"/>
             <a:ext cx="8596668" cy="664029"/>
           </a:xfrm>
         </p:spPr>
@@ -6395,10 +6395,10 @@
       </p:sp>
       <p:grpSp>
         <p:nvGrpSpPr>
-          <p:cNvPr id="3" name="Group 2">
+          <p:cNvPr id="11" name="Group 10">
             <a:extLst>
               <a:ext uri="{FF2B5EF4-FFF2-40B4-BE49-F238E27FC236}">
-                <a16:creationId xmlns:a16="http://schemas.microsoft.com/office/drawing/2014/main" id="{00B7B1D3-FF35-5C49-B0BA-5A721D55B0D0}"/>
+                <a16:creationId xmlns:a16="http://schemas.microsoft.com/office/drawing/2014/main" id="{9C342F52-A521-1B4C-A2FB-ED729E1F8F60}"/>
               </a:ext>
             </a:extLst>
           </p:cNvPr>
@@ -6407,63 +6407,457 @@
         </p:nvGrpSpPr>
         <p:grpSpPr>
           <a:xfrm>
-            <a:off x="677334" y="1404257"/>
-            <a:ext cx="8332414" cy="4818866"/>
-            <a:chOff x="677334" y="1404257"/>
-            <a:chExt cx="8332414" cy="4818866"/>
+            <a:off x="677334" y="1019503"/>
+            <a:ext cx="8494085" cy="5065987"/>
+            <a:chOff x="677334" y="748114"/>
+            <a:chExt cx="8888913" cy="6109885"/>
           </a:xfrm>
         </p:grpSpPr>
-        <p:sp>
-          <p:nvSpPr>
-            <p:cNvPr id="4" name="Left Brace 3">
+        <p:grpSp>
+          <p:nvGrpSpPr>
+            <p:cNvPr id="3" name="Group 2">
               <a:extLst>
                 <a:ext uri="{FF2B5EF4-FFF2-40B4-BE49-F238E27FC236}">
-                  <a16:creationId xmlns:a16="http://schemas.microsoft.com/office/drawing/2014/main" id="{7079EA94-59FD-7E42-8BF9-66A559BF9FE8}"/>
+                  <a16:creationId xmlns:a16="http://schemas.microsoft.com/office/drawing/2014/main" id="{00B7B1D3-FF35-5C49-B0BA-5A721D55B0D0}"/>
                 </a:ext>
               </a:extLst>
             </p:cNvPr>
-            <p:cNvSpPr/>
+            <p:cNvGrpSpPr/>
             <p:nvPr/>
-          </p:nvSpPr>
-          <p:spPr>
+          </p:nvGrpSpPr>
+          <p:grpSpPr>
             <a:xfrm>
-              <a:off x="677334" y="1545773"/>
-              <a:ext cx="762000" cy="4582886"/>
+              <a:off x="677334" y="748114"/>
+              <a:ext cx="8888913" cy="6109885"/>
+              <a:chOff x="677334" y="1404257"/>
+              <a:chExt cx="8888913" cy="4818866"/>
             </a:xfrm>
-            <a:prstGeom prst="leftBrace">
-              <a:avLst/>
-            </a:prstGeom>
-            <a:ln w="19050"/>
-          </p:spPr>
-          <p:style>
-            <a:lnRef idx="1">
-              <a:schemeClr val="accent1"/>
-            </a:lnRef>
-            <a:fillRef idx="0">
-              <a:schemeClr val="accent1"/>
-            </a:fillRef>
-            <a:effectRef idx="0">
-              <a:schemeClr val="accent1"/>
-            </a:effectRef>
-            <a:fontRef idx="minor">
-              <a:schemeClr val="tx1"/>
-            </a:fontRef>
-          </p:style>
-          <p:txBody>
-            <a:bodyPr rtlCol="0" anchor="ctr"/>
-            <a:lstStyle/>
-            <a:p>
-              <a:pPr algn="ctr"/>
-              <a:endParaRPr lang="en-US"/>
-            </a:p>
-          </p:txBody>
-        </p:sp>
+          </p:grpSpPr>
+          <p:sp>
+            <p:nvSpPr>
+              <p:cNvPr id="4" name="Left Brace 3">
+                <a:extLst>
+                  <a:ext uri="{FF2B5EF4-FFF2-40B4-BE49-F238E27FC236}">
+                    <a16:creationId xmlns:a16="http://schemas.microsoft.com/office/drawing/2014/main" id="{7079EA94-59FD-7E42-8BF9-66A559BF9FE8}"/>
+                  </a:ext>
+                </a:extLst>
+              </p:cNvPr>
+              <p:cNvSpPr/>
+              <p:nvPr/>
+            </p:nvSpPr>
+            <p:spPr>
+              <a:xfrm>
+                <a:off x="677334" y="1545773"/>
+                <a:ext cx="762000" cy="4582886"/>
+              </a:xfrm>
+              <a:prstGeom prst="leftBrace">
+                <a:avLst/>
+              </a:prstGeom>
+              <a:ln w="19050"/>
+            </p:spPr>
+            <p:style>
+              <a:lnRef idx="1">
+                <a:schemeClr val="accent1"/>
+              </a:lnRef>
+              <a:fillRef idx="0">
+                <a:schemeClr val="accent1"/>
+              </a:fillRef>
+              <a:effectRef idx="0">
+                <a:schemeClr val="accent1"/>
+              </a:effectRef>
+              <a:fontRef idx="minor">
+                <a:schemeClr val="tx1"/>
+              </a:fontRef>
+            </p:style>
+            <p:txBody>
+              <a:bodyPr rtlCol="0" anchor="ctr"/>
+              <a:lstStyle/>
+              <a:p>
+                <a:pPr algn="ctr"/>
+                <a:endParaRPr lang="en-US"/>
+              </a:p>
+            </p:txBody>
+          </p:sp>
+          <p:sp>
+            <p:nvSpPr>
+              <p:cNvPr id="5" name="TextBox 4">
+                <a:extLst>
+                  <a:ext uri="{FF2B5EF4-FFF2-40B4-BE49-F238E27FC236}">
+                    <a16:creationId xmlns:a16="http://schemas.microsoft.com/office/drawing/2014/main" id="{63DCB454-338A-4E41-AFF6-6AD81D8453A8}"/>
+                  </a:ext>
+                </a:extLst>
+              </p:cNvPr>
+              <p:cNvSpPr txBox="1"/>
+              <p:nvPr/>
+            </p:nvSpPr>
+            <p:spPr>
+              <a:xfrm>
+                <a:off x="1439334" y="1404257"/>
+                <a:ext cx="4051365" cy="369332"/>
+              </a:xfrm>
+              <a:prstGeom prst="rect">
+                <a:avLst/>
+              </a:prstGeom>
+              <a:noFill/>
+            </p:spPr>
+            <p:txBody>
+              <a:bodyPr wrap="none" rtlCol="0">
+                <a:spAutoFit/>
+              </a:bodyPr>
+              <a:lstStyle/>
+              <a:p>
+                <a:r>
+                  <a:rPr lang="en-US" dirty="0">
+                    <a:solidFill>
+                      <a:schemeClr val="accent1">
+                        <a:lumMod val="50000"/>
+                      </a:schemeClr>
+                    </a:solidFill>
+                  </a:rPr>
+                  <a:t>resource: where the maps are saved </a:t>
+                </a:r>
+              </a:p>
+            </p:txBody>
+          </p:sp>
+          <p:sp>
+            <p:nvSpPr>
+              <p:cNvPr id="6" name="TextBox 5">
+                <a:extLst>
+                  <a:ext uri="{FF2B5EF4-FFF2-40B4-BE49-F238E27FC236}">
+                    <a16:creationId xmlns:a16="http://schemas.microsoft.com/office/drawing/2014/main" id="{05089153-7C90-D849-99F1-AE40E006CF0D}"/>
+                  </a:ext>
+                </a:extLst>
+              </p:cNvPr>
+              <p:cNvSpPr txBox="1"/>
+              <p:nvPr/>
+            </p:nvSpPr>
+            <p:spPr>
+              <a:xfrm>
+                <a:off x="1439334" y="1686283"/>
+                <a:ext cx="2702984" cy="369332"/>
+              </a:xfrm>
+              <a:prstGeom prst="rect">
+                <a:avLst/>
+              </a:prstGeom>
+              <a:noFill/>
+            </p:spPr>
+            <p:txBody>
+              <a:bodyPr wrap="none" rtlCol="0">
+                <a:spAutoFit/>
+              </a:bodyPr>
+              <a:lstStyle/>
+              <a:p>
+                <a:r>
+                  <a:rPr lang="en-US" dirty="0" err="1">
+                    <a:solidFill>
+                      <a:schemeClr val="accent1">
+                        <a:lumMod val="50000"/>
+                      </a:schemeClr>
+                    </a:solidFill>
+                  </a:rPr>
+                  <a:t>src</a:t>
+                </a:r>
+                <a:r>
+                  <a:rPr lang="en-US" dirty="0">
+                    <a:solidFill>
+                      <a:schemeClr val="accent1">
+                        <a:lumMod val="50000"/>
+                      </a:schemeClr>
+                    </a:solidFill>
+                  </a:rPr>
+                  <a:t>: where the raw code</a:t>
+                </a:r>
+              </a:p>
+            </p:txBody>
+          </p:sp>
+          <p:sp>
+            <p:nvSpPr>
+              <p:cNvPr id="7" name="TextBox 6">
+                <a:extLst>
+                  <a:ext uri="{FF2B5EF4-FFF2-40B4-BE49-F238E27FC236}">
+                    <a16:creationId xmlns:a16="http://schemas.microsoft.com/office/drawing/2014/main" id="{DF2C120B-CF1A-8C48-85EB-AC7BD2375149}"/>
+                  </a:ext>
+                </a:extLst>
+              </p:cNvPr>
+              <p:cNvSpPr txBox="1"/>
+              <p:nvPr/>
+            </p:nvSpPr>
+            <p:spPr>
+              <a:xfrm>
+                <a:off x="1922808" y="5853791"/>
+                <a:ext cx="3464410" cy="369332"/>
+              </a:xfrm>
+              <a:prstGeom prst="rect">
+                <a:avLst/>
+              </a:prstGeom>
+              <a:noFill/>
+            </p:spPr>
+            <p:txBody>
+              <a:bodyPr wrap="none" rtlCol="0">
+                <a:spAutoFit/>
+              </a:bodyPr>
+              <a:lstStyle/>
+              <a:p>
+                <a:r>
+                  <a:rPr lang="en-US" dirty="0">
+                    <a:solidFill>
+                      <a:schemeClr val="accent1">
+                        <a:lumMod val="50000"/>
+                      </a:schemeClr>
+                    </a:solidFill>
+                  </a:rPr>
+                  <a:t>test: where the test are saved </a:t>
+                </a:r>
+              </a:p>
+            </p:txBody>
+          </p:sp>
+          <p:sp>
+            <p:nvSpPr>
+              <p:cNvPr id="8" name="TextBox 7">
+                <a:extLst>
+                  <a:ext uri="{FF2B5EF4-FFF2-40B4-BE49-F238E27FC236}">
+                    <a16:creationId xmlns:a16="http://schemas.microsoft.com/office/drawing/2014/main" id="{8BDA6325-B3E4-CB49-90A4-B029C4E3FC5D}"/>
+                  </a:ext>
+                </a:extLst>
+              </p:cNvPr>
+              <p:cNvSpPr txBox="1"/>
+              <p:nvPr/>
+            </p:nvSpPr>
+            <p:spPr>
+              <a:xfrm>
+                <a:off x="2401400" y="2313117"/>
+                <a:ext cx="7164847" cy="2950040"/>
+              </a:xfrm>
+              <a:prstGeom prst="rect">
+                <a:avLst/>
+              </a:prstGeom>
+              <a:noFill/>
+            </p:spPr>
+            <p:txBody>
+              <a:bodyPr wrap="none" rtlCol="0">
+                <a:spAutoFit/>
+              </a:bodyPr>
+              <a:lstStyle/>
+              <a:p>
+                <a:pPr>
+                  <a:lnSpc>
+                    <a:spcPct val="150000"/>
+                  </a:lnSpc>
+                </a:pPr>
+                <a:r>
+                  <a:rPr lang="en-US" sz="1600" dirty="0">
+                    <a:solidFill>
+                      <a:schemeClr val="accent1">
+                        <a:lumMod val="50000"/>
+                      </a:schemeClr>
+                    </a:solidFill>
+                  </a:rPr>
+                  <a:t>driver: the entrance of the project</a:t>
+                </a:r>
+              </a:p>
+              <a:p>
+                <a:pPr>
+                  <a:lnSpc>
+                    <a:spcPct val="150000"/>
+                  </a:lnSpc>
+                </a:pPr>
+                <a:r>
+                  <a:rPr lang="en-US" sz="1600" dirty="0" err="1">
+                    <a:solidFill>
+                      <a:schemeClr val="accent1">
+                        <a:lumMod val="50000"/>
+                      </a:schemeClr>
+                    </a:solidFill>
+                  </a:rPr>
+                  <a:t>mapeditor</a:t>
+                </a:r>
+                <a:r>
+                  <a:rPr lang="en-US" sz="1600" dirty="0">
+                    <a:solidFill>
+                      <a:schemeClr val="accent1">
+                        <a:lumMod val="50000"/>
+                      </a:schemeClr>
+                    </a:solidFill>
+                  </a:rPr>
+                  <a:t>: code implement the map editor function</a:t>
+                </a:r>
+              </a:p>
+              <a:p>
+                <a:pPr>
+                  <a:lnSpc>
+                    <a:spcPct val="150000"/>
+                  </a:lnSpc>
+                </a:pPr>
+                <a:r>
+                  <a:rPr lang="en-US" sz="1600" dirty="0">
+                    <a:solidFill>
+                      <a:schemeClr val="accent1">
+                        <a:lumMod val="50000"/>
+                      </a:schemeClr>
+                    </a:solidFill>
+                  </a:rPr>
+                  <a:t>model: data and function in this project, observable</a:t>
+                </a:r>
+              </a:p>
+              <a:p>
+                <a:pPr>
+                  <a:lnSpc>
+                    <a:spcPct val="150000"/>
+                  </a:lnSpc>
+                </a:pPr>
+                <a:r>
+                  <a:rPr lang="en-US" sz="1600" dirty="0">
+                    <a:solidFill>
+                      <a:schemeClr val="accent1">
+                        <a:lumMod val="50000"/>
+                      </a:schemeClr>
+                    </a:solidFill>
+                  </a:rPr>
+                  <a:t>Strategy: include all the strategies used in the game</a:t>
+                </a:r>
+              </a:p>
+              <a:p>
+                <a:pPr>
+                  <a:lnSpc>
+                    <a:spcPct val="150000"/>
+                  </a:lnSpc>
+                </a:pPr>
+                <a:r>
+                  <a:rPr lang="en-US" sz="1600" dirty="0">
+                    <a:solidFill>
+                      <a:schemeClr val="accent1">
+                        <a:lumMod val="50000"/>
+                      </a:schemeClr>
+                    </a:solidFill>
+                  </a:rPr>
+                  <a:t>view: code to show graph based on data, observer</a:t>
+                </a:r>
+              </a:p>
+              <a:p>
+                <a:pPr>
+                  <a:lnSpc>
+                    <a:spcPct val="150000"/>
+                  </a:lnSpc>
+                </a:pPr>
+                <a:r>
+                  <a:rPr lang="en-US" sz="1600" dirty="0">
+                    <a:solidFill>
+                      <a:schemeClr val="accent1">
+                        <a:lumMod val="50000"/>
+                      </a:schemeClr>
+                    </a:solidFill>
+                  </a:rPr>
+                  <a:t>Controller: the </a:t>
+                </a:r>
+                <a:r>
+                  <a:rPr lang="en-CA" sz="1600" dirty="0">
+                    <a:solidFill>
+                      <a:schemeClr val="accent1">
+                        <a:lumMod val="50000"/>
+                      </a:schemeClr>
+                    </a:solidFill>
+                  </a:rPr>
+                  <a:t>mediator</a:t>
+                </a:r>
+                <a:r>
+                  <a:rPr lang="zh-CN" altLang="en-US" sz="1600" dirty="0"/>
+                  <a:t> </a:t>
+                </a:r>
+                <a:r>
+                  <a:rPr lang="en-US" altLang="zh-CN" sz="1600" dirty="0">
+                    <a:solidFill>
+                      <a:schemeClr val="accent1">
+                        <a:lumMod val="50000"/>
+                      </a:schemeClr>
+                    </a:solidFill>
+                  </a:rPr>
+                  <a:t>between model and view, </a:t>
+                </a:r>
+              </a:p>
+              <a:p>
+                <a:pPr>
+                  <a:lnSpc>
+                    <a:spcPct val="150000"/>
+                  </a:lnSpc>
+                </a:pPr>
+                <a:r>
+                  <a:rPr lang="en-US" altLang="zh-CN" sz="1600" dirty="0">
+                    <a:solidFill>
+                      <a:schemeClr val="accent1">
+                        <a:lumMod val="50000"/>
+                      </a:schemeClr>
+                    </a:solidFill>
+                  </a:rPr>
+                  <a:t>		   when player interact with view, help to call the model function</a:t>
+                </a:r>
+                <a:endParaRPr lang="en-US" sz="1600" dirty="0">
+                  <a:solidFill>
+                    <a:schemeClr val="accent1">
+                      <a:lumMod val="50000"/>
+                    </a:schemeClr>
+                  </a:solidFill>
+                </a:endParaRPr>
+              </a:p>
+              <a:p>
+                <a:pPr>
+                  <a:lnSpc>
+                    <a:spcPct val="150000"/>
+                  </a:lnSpc>
+                </a:pPr>
+                <a:r>
+                  <a:rPr lang="en-US" sz="1600" dirty="0">
+                    <a:solidFill>
+                      <a:schemeClr val="accent1">
+                        <a:lumMod val="50000"/>
+                      </a:schemeClr>
+                    </a:solidFill>
+                  </a:rPr>
+                  <a:t>validate: code to verify a map’s validity</a:t>
+                </a:r>
+              </a:p>
+              <a:p>
+                <a:pPr>
+                  <a:lnSpc>
+                    <a:spcPct val="150000"/>
+                  </a:lnSpc>
+                </a:pPr>
+                <a:r>
+                  <a:rPr lang="en-US" sz="1600" dirty="0">
+                    <a:solidFill>
+                      <a:schemeClr val="accent1">
+                        <a:lumMod val="50000"/>
+                      </a:schemeClr>
+                    </a:solidFill>
+                  </a:rPr>
+                  <a:t>common: code that other modules can use together</a:t>
+                </a:r>
+              </a:p>
+              <a:p>
+                <a:pPr>
+                  <a:lnSpc>
+                    <a:spcPct val="150000"/>
+                  </a:lnSpc>
+                </a:pPr>
+                <a:r>
+                  <a:rPr lang="en-US" sz="1600" dirty="0">
+                    <a:solidFill>
+                      <a:schemeClr val="accent1">
+                        <a:lumMod val="50000"/>
+                      </a:schemeClr>
+                    </a:solidFill>
+                  </a:rPr>
+                  <a:t>exception: define exceptions in the project</a:t>
+                </a:r>
+              </a:p>
+            </p:txBody>
+          </p:sp>
+        </p:grpSp>
         <p:sp>
           <p:nvSpPr>
-            <p:cNvPr id="5" name="TextBox 4">
+            <p:cNvPr id="10" name="TextBox 9">
               <a:extLst>
                 <a:ext uri="{FF2B5EF4-FFF2-40B4-BE49-F238E27FC236}">
-                  <a16:creationId xmlns:a16="http://schemas.microsoft.com/office/drawing/2014/main" id="{63DCB454-338A-4E41-AFF6-6AD81D8453A8}"/>
+                  <a16:creationId xmlns:a16="http://schemas.microsoft.com/office/drawing/2014/main" id="{C3630B32-21FB-7F41-BC9F-A8497620034D}"/>
                 </a:ext>
               </a:extLst>
             </p:cNvPr>
@@ -6472,8 +6866,8 @@
           </p:nvSpPr>
           <p:spPr>
             <a:xfrm>
-              <a:off x="1439334" y="1404257"/>
-              <a:ext cx="4051365" cy="369332"/>
+              <a:off x="1907419" y="1545064"/>
+              <a:ext cx="4147289" cy="369332"/>
             </a:xfrm>
             <a:prstGeom prst="rect">
               <a:avLst/>
@@ -6494,373 +6888,7 @@
                     </a:schemeClr>
                   </a:solidFill>
                 </a:rPr>
-                <a:t>resource: where the maps are saved </a:t>
-              </a:r>
-            </a:p>
-          </p:txBody>
-        </p:sp>
-        <p:sp>
-          <p:nvSpPr>
-            <p:cNvPr id="6" name="TextBox 5">
-              <a:extLst>
-                <a:ext uri="{FF2B5EF4-FFF2-40B4-BE49-F238E27FC236}">
-                  <a16:creationId xmlns:a16="http://schemas.microsoft.com/office/drawing/2014/main" id="{05089153-7C90-D849-99F1-AE40E006CF0D}"/>
-                </a:ext>
-              </a:extLst>
-            </p:cNvPr>
-            <p:cNvSpPr txBox="1"/>
-            <p:nvPr/>
-          </p:nvSpPr>
-          <p:spPr>
-            <a:xfrm>
-              <a:off x="1439334" y="2159242"/>
-              <a:ext cx="2702984" cy="369332"/>
-            </a:xfrm>
-            <a:prstGeom prst="rect">
-              <a:avLst/>
-            </a:prstGeom>
-            <a:noFill/>
-          </p:spPr>
-          <p:txBody>
-            <a:bodyPr wrap="none" rtlCol="0">
-              <a:spAutoFit/>
-            </a:bodyPr>
-            <a:lstStyle/>
-            <a:p>
-              <a:r>
-                <a:rPr lang="en-US" dirty="0" err="1">
-                  <a:solidFill>
-                    <a:schemeClr val="accent1">
-                      <a:lumMod val="50000"/>
-                    </a:schemeClr>
-                  </a:solidFill>
-                </a:rPr>
-                <a:t>src</a:t>
-              </a:r>
-              <a:r>
-                <a:rPr lang="en-US" dirty="0">
-                  <a:solidFill>
-                    <a:schemeClr val="accent1">
-                      <a:lumMod val="50000"/>
-                    </a:schemeClr>
-                  </a:solidFill>
-                </a:rPr>
-                <a:t>: where the raw code</a:t>
-              </a:r>
-            </a:p>
-          </p:txBody>
-        </p:sp>
-        <p:sp>
-          <p:nvSpPr>
-            <p:cNvPr id="7" name="TextBox 6">
-              <a:extLst>
-                <a:ext uri="{FF2B5EF4-FFF2-40B4-BE49-F238E27FC236}">
-                  <a16:creationId xmlns:a16="http://schemas.microsoft.com/office/drawing/2014/main" id="{DF2C120B-CF1A-8C48-85EB-AC7BD2375149}"/>
-                </a:ext>
-              </a:extLst>
-            </p:cNvPr>
-            <p:cNvSpPr txBox="1"/>
-            <p:nvPr/>
-          </p:nvSpPr>
-          <p:spPr>
-            <a:xfrm>
-              <a:off x="1439333" y="5853791"/>
-              <a:ext cx="3464410" cy="369332"/>
-            </a:xfrm>
-            <a:prstGeom prst="rect">
-              <a:avLst/>
-            </a:prstGeom>
-            <a:noFill/>
-          </p:spPr>
-          <p:txBody>
-            <a:bodyPr wrap="none" rtlCol="0">
-              <a:spAutoFit/>
-            </a:bodyPr>
-            <a:lstStyle/>
-            <a:p>
-              <a:r>
-                <a:rPr lang="en-US" dirty="0">
-                  <a:solidFill>
-                    <a:schemeClr val="accent1">
-                      <a:lumMod val="50000"/>
-                    </a:schemeClr>
-                  </a:solidFill>
-                </a:rPr>
-                <a:t>test: where the test are saved </a:t>
-              </a:r>
-            </a:p>
-          </p:txBody>
-        </p:sp>
-        <p:sp>
-          <p:nvSpPr>
-            <p:cNvPr id="8" name="TextBox 7">
-              <a:extLst>
-                <a:ext uri="{FF2B5EF4-FFF2-40B4-BE49-F238E27FC236}">
-                  <a16:creationId xmlns:a16="http://schemas.microsoft.com/office/drawing/2014/main" id="{8BDA6325-B3E4-CB49-90A4-B029C4E3FC5D}"/>
-                </a:ext>
-              </a:extLst>
-            </p:cNvPr>
-            <p:cNvSpPr txBox="1"/>
-            <p:nvPr/>
-          </p:nvSpPr>
-          <p:spPr>
-            <a:xfrm>
-              <a:off x="1907419" y="2491322"/>
-              <a:ext cx="7102329" cy="3371051"/>
-            </a:xfrm>
-            <a:prstGeom prst="rect">
-              <a:avLst/>
-            </a:prstGeom>
-            <a:noFill/>
-          </p:spPr>
-          <p:txBody>
-            <a:bodyPr wrap="none" rtlCol="0">
-              <a:spAutoFit/>
-            </a:bodyPr>
-            <a:lstStyle/>
-            <a:p>
-              <a:pPr>
-                <a:lnSpc>
-                  <a:spcPct val="150000"/>
-                </a:lnSpc>
-              </a:pPr>
-              <a:r>
-                <a:rPr lang="en-US" sz="1600" dirty="0">
-                  <a:solidFill>
-                    <a:schemeClr val="accent1">
-                      <a:lumMod val="50000"/>
-                    </a:schemeClr>
-                  </a:solidFill>
-                </a:rPr>
-                <a:t>driver: the entrance of the project</a:t>
-              </a:r>
-            </a:p>
-            <a:p>
-              <a:pPr>
-                <a:lnSpc>
-                  <a:spcPct val="150000"/>
-                </a:lnSpc>
-              </a:pPr>
-              <a:r>
-                <a:rPr lang="en-US" sz="1600" dirty="0" err="1">
-                  <a:solidFill>
-                    <a:schemeClr val="accent1">
-                      <a:lumMod val="50000"/>
-                    </a:schemeClr>
-                  </a:solidFill>
-                </a:rPr>
-                <a:t>mapeditor</a:t>
-              </a:r>
-              <a:r>
-                <a:rPr lang="en-US" sz="1600" dirty="0">
-                  <a:solidFill>
-                    <a:schemeClr val="accent1">
-                      <a:lumMod val="50000"/>
-                    </a:schemeClr>
-                  </a:solidFill>
-                </a:rPr>
-                <a:t>: code implement the map editor function</a:t>
-              </a:r>
-            </a:p>
-            <a:p>
-              <a:pPr>
-                <a:lnSpc>
-                  <a:spcPct val="150000"/>
-                </a:lnSpc>
-              </a:pPr>
-              <a:r>
-                <a:rPr lang="en-US" sz="1600" dirty="0">
-                  <a:solidFill>
-                    <a:schemeClr val="accent1">
-                      <a:lumMod val="50000"/>
-                    </a:schemeClr>
-                  </a:solidFill>
-                </a:rPr>
-                <a:t>model: data and function in this project, observable</a:t>
-              </a:r>
-            </a:p>
-            <a:p>
-              <a:pPr>
-                <a:lnSpc>
-                  <a:spcPct val="150000"/>
-                </a:lnSpc>
-              </a:pPr>
-              <a:r>
-                <a:rPr lang="en-US" sz="1600" dirty="0">
-                  <a:solidFill>
-                    <a:schemeClr val="accent1">
-                      <a:lumMod val="50000"/>
-                    </a:schemeClr>
-                  </a:solidFill>
-                </a:rPr>
-                <a:t>view: code to show graph based on data, observer</a:t>
-              </a:r>
-            </a:p>
-            <a:p>
-              <a:pPr>
-                <a:lnSpc>
-                  <a:spcPct val="150000"/>
-                </a:lnSpc>
-              </a:pPr>
-              <a:r>
-                <a:rPr lang="en-US" sz="1600" dirty="0">
-                  <a:solidFill>
-                    <a:schemeClr val="accent1">
-                      <a:lumMod val="50000"/>
-                    </a:schemeClr>
-                  </a:solidFill>
-                </a:rPr>
-                <a:t>Controller: the </a:t>
-              </a:r>
-              <a:r>
-                <a:rPr lang="en-CA" sz="1600" dirty="0">
-                  <a:solidFill>
-                    <a:schemeClr val="accent1">
-                      <a:lumMod val="50000"/>
-                    </a:schemeClr>
-                  </a:solidFill>
-                </a:rPr>
-                <a:t>mediator</a:t>
-              </a:r>
-              <a:r>
-                <a:rPr lang="zh-CN" altLang="en-US" sz="1600" dirty="0"/>
-                <a:t> </a:t>
-              </a:r>
-              <a:r>
-                <a:rPr lang="en-US" altLang="zh-CN" sz="1600" dirty="0">
-                  <a:solidFill>
-                    <a:schemeClr val="accent1">
-                      <a:lumMod val="50000"/>
-                    </a:schemeClr>
-                  </a:solidFill>
-                </a:rPr>
-                <a:t>between model and view, </a:t>
-              </a:r>
-            </a:p>
-            <a:p>
-              <a:pPr>
-                <a:lnSpc>
-                  <a:spcPct val="150000"/>
-                </a:lnSpc>
-              </a:pPr>
-              <a:r>
-                <a:rPr lang="en-US" altLang="zh-CN" sz="1600" dirty="0">
-                  <a:solidFill>
-                    <a:schemeClr val="accent1">
-                      <a:lumMod val="50000"/>
-                    </a:schemeClr>
-                  </a:solidFill>
-                </a:rPr>
-                <a:t>		   when player interact with view, help to call the model function</a:t>
-              </a:r>
-              <a:endParaRPr lang="en-US" sz="1600" dirty="0">
-                <a:solidFill>
-                  <a:schemeClr val="accent1">
-                    <a:lumMod val="50000"/>
-                  </a:schemeClr>
-                </a:solidFill>
-              </a:endParaRPr>
-            </a:p>
-            <a:p>
-              <a:pPr>
-                <a:lnSpc>
-                  <a:spcPct val="150000"/>
-                </a:lnSpc>
-              </a:pPr>
-              <a:r>
-                <a:rPr lang="en-US" sz="1600" dirty="0">
-                  <a:solidFill>
-                    <a:schemeClr val="accent1">
-                      <a:lumMod val="50000"/>
-                    </a:schemeClr>
-                  </a:solidFill>
-                </a:rPr>
-                <a:t>validate: code to verify a map’s validity</a:t>
-              </a:r>
-            </a:p>
-            <a:p>
-              <a:pPr>
-                <a:lnSpc>
-                  <a:spcPct val="150000"/>
-                </a:lnSpc>
-              </a:pPr>
-              <a:r>
-                <a:rPr lang="en-US" sz="1600" dirty="0">
-                  <a:solidFill>
-                    <a:schemeClr val="accent1">
-                      <a:lumMod val="50000"/>
-                    </a:schemeClr>
-                  </a:solidFill>
-                </a:rPr>
-                <a:t>common: code that other modules can use together</a:t>
-              </a:r>
-            </a:p>
-            <a:p>
-              <a:pPr>
-                <a:lnSpc>
-                  <a:spcPct val="150000"/>
-                </a:lnSpc>
-              </a:pPr>
-              <a:r>
-                <a:rPr lang="en-US" sz="1600" dirty="0">
-                  <a:solidFill>
-                    <a:schemeClr val="accent1">
-                      <a:lumMod val="50000"/>
-                    </a:schemeClr>
-                  </a:solidFill>
-                </a:rPr>
-                <a:t>exception: define exceptions in the project</a:t>
-              </a:r>
-            </a:p>
-          </p:txBody>
-        </p:sp>
-        <p:sp>
-          <p:nvSpPr>
-            <p:cNvPr id="9" name="TextBox 8">
-              <a:extLst>
-                <a:ext uri="{FF2B5EF4-FFF2-40B4-BE49-F238E27FC236}">
-                  <a16:creationId xmlns:a16="http://schemas.microsoft.com/office/drawing/2014/main" id="{4B636185-C113-3047-B175-FB265E1E71C2}"/>
-                </a:ext>
-              </a:extLst>
-            </p:cNvPr>
-            <p:cNvSpPr txBox="1"/>
-            <p:nvPr/>
-          </p:nvSpPr>
-          <p:spPr>
-            <a:xfrm>
-              <a:off x="1439333" y="1755399"/>
-              <a:ext cx="6890028" cy="369332"/>
-            </a:xfrm>
-            <a:prstGeom prst="rect">
-              <a:avLst/>
-            </a:prstGeom>
-            <a:noFill/>
-          </p:spPr>
-          <p:txBody>
-            <a:bodyPr wrap="none" rtlCol="0">
-              <a:spAutoFit/>
-            </a:bodyPr>
-            <a:lstStyle/>
-            <a:p>
-              <a:r>
-                <a:rPr lang="en-US" dirty="0" err="1">
-                  <a:solidFill>
-                    <a:schemeClr val="accent1">
-                      <a:lumMod val="50000"/>
-                    </a:schemeClr>
-                  </a:solidFill>
-                </a:rPr>
-                <a:t>javadoc</a:t>
-              </a:r>
-              <a:r>
-                <a:rPr lang="en-US" dirty="0">
-                  <a:solidFill>
-                    <a:schemeClr val="accent1">
-                      <a:lumMod val="50000"/>
-                    </a:schemeClr>
-                  </a:solidFill>
-                </a:rPr>
-                <a:t>: where the documentation about this project are saved </a:t>
+                <a:t>main: where the original code located</a:t>
               </a:r>
             </a:p>
           </p:txBody>

</xml_diff>

<commit_message>
Update: 1.update the document
</commit_message>
<xml_diff>
--- a/documentation/build3/Architecture_build2.pptx
+++ b/documentation/build3/Architecture_build2.pptx
@@ -6407,10 +6407,10 @@
         </p:nvGrpSpPr>
         <p:grpSpPr>
           <a:xfrm>
-            <a:off x="677334" y="1019503"/>
-            <a:ext cx="8494085" cy="5065987"/>
-            <a:chOff x="677334" y="748114"/>
-            <a:chExt cx="8888913" cy="6109885"/>
+            <a:off x="677334" y="927252"/>
+            <a:ext cx="9040619" cy="5447201"/>
+            <a:chOff x="677334" y="636850"/>
+            <a:chExt cx="9460853" cy="6569656"/>
           </a:xfrm>
         </p:grpSpPr>
         <p:grpSp>
@@ -6427,10 +6427,10 @@
           </p:nvGrpSpPr>
           <p:grpSpPr>
             <a:xfrm>
-              <a:off x="677334" y="748114"/>
-              <a:ext cx="8888913" cy="6109885"/>
-              <a:chOff x="677334" y="1404257"/>
-              <a:chExt cx="8888913" cy="4818866"/>
+              <a:off x="677334" y="636850"/>
+              <a:ext cx="9460853" cy="6569656"/>
+              <a:chOff x="677334" y="1316501"/>
+              <a:chExt cx="9460853" cy="5181489"/>
             </a:xfrm>
           </p:grpSpPr>
           <p:sp>
@@ -6447,8 +6447,8 @@
             </p:nvSpPr>
             <p:spPr>
               <a:xfrm>
-                <a:off x="677334" y="1545773"/>
-                <a:ext cx="762000" cy="4582886"/>
+                <a:off x="677334" y="1316501"/>
+                <a:ext cx="762000" cy="5106575"/>
               </a:xfrm>
               <a:prstGeom prst="leftBrace">
                 <a:avLst/>
@@ -6492,8 +6492,8 @@
             </p:nvSpPr>
             <p:spPr>
               <a:xfrm>
-                <a:off x="1439334" y="1404257"/>
-                <a:ext cx="4051365" cy="369332"/>
+                <a:off x="2504400" y="5749104"/>
+                <a:ext cx="4051364" cy="369332"/>
               </a:xfrm>
               <a:prstGeom prst="rect">
                 <a:avLst/>
@@ -6533,7 +6533,7 @@
             </p:nvSpPr>
             <p:spPr>
               <a:xfrm>
-                <a:off x="1439334" y="1686283"/>
+                <a:off x="1439334" y="1316501"/>
                 <a:ext cx="2702984" cy="369332"/>
               </a:xfrm>
               <a:prstGeom prst="rect">
@@ -6584,7 +6584,7 @@
             </p:nvSpPr>
             <p:spPr>
               <a:xfrm>
-                <a:off x="1922808" y="5853791"/>
+                <a:off x="1907419" y="6128658"/>
                 <a:ext cx="3464410" cy="369332"/>
               </a:xfrm>
               <a:prstGeom prst="rect">
@@ -6625,8 +6625,8 @@
             </p:nvSpPr>
             <p:spPr>
               <a:xfrm>
-                <a:off x="2401400" y="2313117"/>
-                <a:ext cx="7164847" cy="2950040"/>
+                <a:off x="2973341" y="2233684"/>
+                <a:ext cx="7164846" cy="2950040"/>
               </a:xfrm>
               <a:prstGeom prst="rect">
                 <a:avLst/>
@@ -6866,8 +6866,8 @@
           </p:nvSpPr>
           <p:spPr>
             <a:xfrm>
-              <a:off x="1907419" y="1545064"/>
-              <a:ext cx="4147289" cy="369332"/>
+              <a:off x="1907419" y="1012672"/>
+              <a:ext cx="6242370" cy="445437"/>
             </a:xfrm>
             <a:prstGeom prst="rect">
               <a:avLst/>
@@ -6888,12 +6888,83 @@
                     </a:schemeClr>
                   </a:solidFill>
                 </a:rPr>
-                <a:t>main: where the original code located</a:t>
+                <a:t>main: where the original code</a:t>
+              </a:r>
+              <a:r>
+                <a:rPr lang="zh-CN" altLang="en-US" dirty="0">
+                  <a:solidFill>
+                    <a:schemeClr val="accent1">
+                      <a:lumMod val="50000"/>
+                    </a:schemeClr>
+                  </a:solidFill>
+                </a:rPr>
+                <a:t> </a:t>
+              </a:r>
+              <a:r>
+                <a:rPr lang="en-CA" altLang="zh-CN" dirty="0">
+                  <a:solidFill>
+                    <a:schemeClr val="accent1">
+                      <a:lumMod val="50000"/>
+                    </a:schemeClr>
+                  </a:solidFill>
+                </a:rPr>
+                <a:t>and resource file</a:t>
+              </a:r>
+              <a:r>
+                <a:rPr lang="en-US" dirty="0">
+                  <a:solidFill>
+                    <a:schemeClr val="accent1">
+                      <a:lumMod val="50000"/>
+                    </a:schemeClr>
+                  </a:solidFill>
+                </a:rPr>
+                <a:t> located</a:t>
               </a:r>
             </a:p>
           </p:txBody>
         </p:sp>
       </p:grpSp>
+      <p:sp>
+        <p:nvSpPr>
+          <p:cNvPr id="12" name="TextBox 11">
+            <a:extLst>
+              <a:ext uri="{FF2B5EF4-FFF2-40B4-BE49-F238E27FC236}">
+                <a16:creationId xmlns:a16="http://schemas.microsoft.com/office/drawing/2014/main" id="{C1969136-8D63-4A41-BF73-4E8E209249CE}"/>
+              </a:ext>
+            </a:extLst>
+          </p:cNvPr>
+          <p:cNvSpPr txBox="1"/>
+          <p:nvPr/>
+        </p:nvSpPr>
+        <p:spPr>
+          <a:xfrm>
+            <a:off x="2424418" y="1597450"/>
+            <a:ext cx="1725152" cy="369332"/>
+          </a:xfrm>
+          <a:prstGeom prst="rect">
+            <a:avLst/>
+          </a:prstGeom>
+          <a:noFill/>
+        </p:spPr>
+        <p:txBody>
+          <a:bodyPr wrap="none" rtlCol="0">
+            <a:spAutoFit/>
+          </a:bodyPr>
+          <a:lstStyle/>
+          <a:p>
+            <a:r>
+              <a:rPr lang="en-US" dirty="0">
+                <a:solidFill>
+                  <a:schemeClr val="accent1">
+                    <a:lumMod val="50000"/>
+                  </a:schemeClr>
+                </a:solidFill>
+              </a:rPr>
+              <a:t>java: raw code</a:t>
+            </a:r>
+          </a:p>
+        </p:txBody>
+      </p:sp>
     </p:spTree>
     <p:extLst>
       <p:ext uri="{BB962C8B-B14F-4D97-AF65-F5344CB8AC3E}">

</xml_diff>